<commit_message>
css, bootstrap, javascript basics
</commit_message>
<xml_diff>
--- a/Week4(HTML,CSS,JS,Servlet,REST)/notes_images/html-css-js.pptx
+++ b/Week4(HTML,CSS,JS,Servlet,REST)/notes_images/html-css-js.pptx
@@ -8,6 +8,8 @@
     <p:sldId id="306" r:id="rId2"/>
     <p:sldId id="270" r:id="rId3"/>
     <p:sldId id="479" r:id="rId4"/>
+    <p:sldId id="425" r:id="rId5"/>
+    <p:sldId id="426" r:id="rId6"/>
   </p:sldIdLst>
   <p:sldSz cx="12192000" cy="6858000"/>
   <p:notesSz cx="6858000" cy="9144000"/>
@@ -11062,6 +11064,2362 @@
 </p:sld>
 </file>
 
+<file path=ppt/slides/slide4.xml><?xml version="1.0" encoding="utf-8"?>
+<p:sld xmlns:a="http://schemas.openxmlformats.org/drawingml/2006/main" xmlns:r="http://schemas.openxmlformats.org/officeDocument/2006/relationships" xmlns:p="http://schemas.openxmlformats.org/presentationml/2006/main">
+  <p:cSld>
+    <p:spTree>
+      <p:nvGrpSpPr>
+        <p:cNvPr id="1" name=""/>
+        <p:cNvGrpSpPr/>
+        <p:nvPr/>
+      </p:nvGrpSpPr>
+      <p:grpSpPr>
+        <a:xfrm>
+          <a:off x="0" y="0"/>
+          <a:ext cx="0" cy="0"/>
+          <a:chOff x="0" y="0"/>
+          <a:chExt cx="0" cy="0"/>
+        </a:xfrm>
+      </p:grpSpPr>
+      <p:sp>
+        <p:nvSpPr>
+          <p:cNvPr id="2" name="Title 1">
+            <a:extLst>
+              <a:ext uri="{FF2B5EF4-FFF2-40B4-BE49-F238E27FC236}">
+                <a16:creationId xmlns:a16="http://schemas.microsoft.com/office/drawing/2014/main" id="{E1723254-ABAE-40AE-8019-633B8E80D787}"/>
+              </a:ext>
+            </a:extLst>
+          </p:cNvPr>
+          <p:cNvSpPr>
+            <a:spLocks noGrp="1"/>
+          </p:cNvSpPr>
+          <p:nvPr>
+            <p:ph type="title"/>
+          </p:nvPr>
+        </p:nvSpPr>
+        <p:spPr/>
+        <p:txBody>
+          <a:bodyPr/>
+          <a:lstStyle/>
+          <a:p>
+            <a:r>
+              <a:rPr lang="en-US" dirty="0"/>
+              <a:t>History of JavaScript (1994)</a:t>
+            </a:r>
+            <a:endParaRPr lang="en-IN" dirty="0"/>
+          </a:p>
+        </p:txBody>
+      </p:sp>
+      <p:pic>
+        <p:nvPicPr>
+          <p:cNvPr id="1026" name="Picture 2">
+            <a:extLst>
+              <a:ext uri="{FF2B5EF4-FFF2-40B4-BE49-F238E27FC236}">
+                <a16:creationId xmlns:a16="http://schemas.microsoft.com/office/drawing/2014/main" id="{FC50C5FE-FDB1-4A16-8229-73A70C95D585}"/>
+              </a:ext>
+            </a:extLst>
+          </p:cNvPr>
+          <p:cNvPicPr>
+            <a:picLocks noChangeAspect="1" noChangeArrowheads="1"/>
+          </p:cNvPicPr>
+          <p:nvPr/>
+        </p:nvPicPr>
+        <p:blipFill>
+          <a:blip r:embed="rId2">
+            <a:extLst>
+              <a:ext uri="{28A0092B-C50C-407E-A947-70E740481C1C}">
+                <a14:useLocalDpi xmlns:a14="http://schemas.microsoft.com/office/drawing/2010/main" val="0"/>
+              </a:ext>
+            </a:extLst>
+          </a:blip>
+          <a:srcRect/>
+          <a:stretch>
+            <a:fillRect/>
+          </a:stretch>
+        </p:blipFill>
+        <p:spPr bwMode="auto">
+          <a:xfrm>
+            <a:off x="898333" y="2726547"/>
+            <a:ext cx="4520269" cy="3725640"/>
+          </a:xfrm>
+          <a:prstGeom prst="rect">
+            <a:avLst/>
+          </a:prstGeom>
+          <a:noFill/>
+          <a:extLst>
+            <a:ext uri="{909E8E84-426E-40DD-AFC4-6F175D3DCCD1}">
+              <a14:hiddenFill xmlns:a14="http://schemas.microsoft.com/office/drawing/2010/main">
+                <a:solidFill>
+                  <a:srgbClr val="FFFFFF"/>
+                </a:solidFill>
+              </a14:hiddenFill>
+            </a:ext>
+          </a:extLst>
+        </p:spPr>
+      </p:pic>
+      <p:pic>
+        <p:nvPicPr>
+          <p:cNvPr id="5" name="Picture 4">
+            <a:extLst>
+              <a:ext uri="{FF2B5EF4-FFF2-40B4-BE49-F238E27FC236}">
+                <a16:creationId xmlns:a16="http://schemas.microsoft.com/office/drawing/2014/main" id="{1B101954-CEFD-4513-AB22-F659F1E5B005}"/>
+              </a:ext>
+            </a:extLst>
+          </p:cNvPr>
+          <p:cNvPicPr>
+            <a:picLocks noChangeAspect="1"/>
+          </p:cNvPicPr>
+          <p:nvPr/>
+        </p:nvPicPr>
+        <p:blipFill>
+          <a:blip r:embed="rId3"/>
+          <a:stretch>
+            <a:fillRect/>
+          </a:stretch>
+        </p:blipFill>
+        <p:spPr>
+          <a:xfrm>
+            <a:off x="898334" y="1766103"/>
+            <a:ext cx="2212512" cy="704391"/>
+          </a:xfrm>
+          <a:prstGeom prst="rect">
+            <a:avLst/>
+          </a:prstGeom>
+        </p:spPr>
+      </p:pic>
+      <p:sp>
+        <p:nvSpPr>
+          <p:cNvPr id="8" name="Title 1">
+            <a:extLst>
+              <a:ext uri="{FF2B5EF4-FFF2-40B4-BE49-F238E27FC236}">
+                <a16:creationId xmlns:a16="http://schemas.microsoft.com/office/drawing/2014/main" id="{174049BD-06ED-44C0-89C9-49ABCFA5D63C}"/>
+              </a:ext>
+            </a:extLst>
+          </p:cNvPr>
+          <p:cNvSpPr txBox="1">
+            <a:spLocks/>
+          </p:cNvSpPr>
+          <p:nvPr/>
+        </p:nvSpPr>
+        <p:spPr>
+          <a:xfrm>
+            <a:off x="6351548" y="2103437"/>
+            <a:ext cx="4753583" cy="1325563"/>
+          </a:xfrm>
+          <a:prstGeom prst="rect">
+            <a:avLst/>
+          </a:prstGeom>
+          <a:solidFill>
+            <a:schemeClr val="accent5">
+              <a:lumMod val="75000"/>
+            </a:schemeClr>
+          </a:solidFill>
+        </p:spPr>
+        <p:txBody>
+          <a:bodyPr vert="horz" lIns="91440" tIns="45720" rIns="91440" bIns="45720" rtlCol="0" anchor="ctr">
+            <a:normAutofit/>
+          </a:bodyPr>
+          <a:lstStyle>
+            <a:lvl1pPr algn="l" defTabSz="914400" rtl="0" eaLnBrk="1" latinLnBrk="0" hangingPunct="1">
+              <a:lnSpc>
+                <a:spcPct val="90000"/>
+              </a:lnSpc>
+              <a:spcBef>
+                <a:spcPct val="0"/>
+              </a:spcBef>
+              <a:buNone/>
+              <a:defRPr sz="6000" kern="1200">
+                <a:solidFill>
+                  <a:schemeClr val="accent5">
+                    <a:lumMod val="75000"/>
+                  </a:schemeClr>
+                </a:solidFill>
+                <a:latin typeface="Segoe UI Light" panose="020B0502040204020203" pitchFamily="34" charset="0"/>
+                <a:ea typeface="+mj-ea"/>
+                <a:cs typeface="Segoe UI Light" panose="020B0502040204020203" pitchFamily="34" charset="0"/>
+              </a:defRPr>
+            </a:lvl1pPr>
+          </a:lstStyle>
+          <a:p>
+            <a:pPr algn="ctr">
+              <a:lnSpc>
+                <a:spcPct val="120000"/>
+              </a:lnSpc>
+            </a:pPr>
+            <a:r>
+              <a:rPr lang="en-US" sz="3200" dirty="0">
+                <a:solidFill>
+                  <a:schemeClr val="bg1"/>
+                </a:solidFill>
+              </a:rPr>
+              <a:t>No dynamic behavior after the page was loaded</a:t>
+            </a:r>
+            <a:endParaRPr lang="en-IN" sz="3200" dirty="0">
+              <a:solidFill>
+                <a:schemeClr val="bg1"/>
+              </a:solidFill>
+            </a:endParaRPr>
+          </a:p>
+        </p:txBody>
+      </p:sp>
+      <p:sp>
+        <p:nvSpPr>
+          <p:cNvPr id="11" name="Title 1">
+            <a:extLst>
+              <a:ext uri="{FF2B5EF4-FFF2-40B4-BE49-F238E27FC236}">
+                <a16:creationId xmlns:a16="http://schemas.microsoft.com/office/drawing/2014/main" id="{65DB2982-BDA8-4810-AE59-457667729F59}"/>
+              </a:ext>
+            </a:extLst>
+          </p:cNvPr>
+          <p:cNvSpPr txBox="1">
+            <a:spLocks/>
+          </p:cNvSpPr>
+          <p:nvPr/>
+        </p:nvSpPr>
+        <p:spPr>
+          <a:xfrm>
+            <a:off x="6351548" y="3990369"/>
+            <a:ext cx="4753583" cy="1731701"/>
+          </a:xfrm>
+          <a:prstGeom prst="rect">
+            <a:avLst/>
+          </a:prstGeom>
+          <a:solidFill>
+            <a:schemeClr val="accent5">
+              <a:lumMod val="75000"/>
+            </a:schemeClr>
+          </a:solidFill>
+        </p:spPr>
+        <p:txBody>
+          <a:bodyPr vert="horz" lIns="91440" tIns="45720" rIns="91440" bIns="45720" rtlCol="0" anchor="ctr">
+            <a:normAutofit lnSpcReduction="10000"/>
+          </a:bodyPr>
+          <a:lstStyle>
+            <a:lvl1pPr algn="l" defTabSz="914400" rtl="0" eaLnBrk="1" latinLnBrk="0" hangingPunct="1">
+              <a:lnSpc>
+                <a:spcPct val="90000"/>
+              </a:lnSpc>
+              <a:spcBef>
+                <a:spcPct val="0"/>
+              </a:spcBef>
+              <a:buNone/>
+              <a:defRPr sz="6000" kern="1200">
+                <a:solidFill>
+                  <a:schemeClr val="accent5">
+                    <a:lumMod val="75000"/>
+                  </a:schemeClr>
+                </a:solidFill>
+                <a:latin typeface="Segoe UI Light" panose="020B0502040204020203" pitchFamily="34" charset="0"/>
+                <a:ea typeface="+mj-ea"/>
+                <a:cs typeface="Segoe UI Light" panose="020B0502040204020203" pitchFamily="34" charset="0"/>
+              </a:defRPr>
+            </a:lvl1pPr>
+          </a:lstStyle>
+          <a:p>
+            <a:pPr algn="ctr">
+              <a:lnSpc>
+                <a:spcPct val="120000"/>
+              </a:lnSpc>
+            </a:pPr>
+            <a:r>
+              <a:rPr lang="en-US" sz="3200" dirty="0">
+                <a:solidFill>
+                  <a:schemeClr val="bg1"/>
+                </a:solidFill>
+              </a:rPr>
+              <a:t>There was a compelling need to overcome this limitation</a:t>
+            </a:r>
+            <a:endParaRPr lang="en-IN" sz="3200" dirty="0">
+              <a:solidFill>
+                <a:schemeClr val="bg1"/>
+              </a:solidFill>
+            </a:endParaRPr>
+          </a:p>
+        </p:txBody>
+      </p:sp>
+    </p:spTree>
+    <p:extLst>
+      <p:ext uri="{BB962C8B-B14F-4D97-AF65-F5344CB8AC3E}">
+        <p14:creationId xmlns:p14="http://schemas.microsoft.com/office/powerpoint/2010/main" val="407265431"/>
+      </p:ext>
+    </p:extLst>
+  </p:cSld>
+  <p:clrMapOvr>
+    <a:masterClrMapping/>
+  </p:clrMapOvr>
+  <p:timing>
+    <p:tnLst>
+      <p:par>
+        <p:cTn id="1" dur="indefinite" restart="never" nodeType="tmRoot">
+          <p:childTnLst>
+            <p:seq concurrent="1" nextAc="seek">
+              <p:cTn id="2" dur="indefinite" nodeType="mainSeq">
+                <p:childTnLst>
+                  <p:par>
+                    <p:cTn id="3" fill="hold">
+                      <p:stCondLst>
+                        <p:cond delay="indefinite"/>
+                      </p:stCondLst>
+                      <p:childTnLst>
+                        <p:par>
+                          <p:cTn id="4" fill="hold">
+                            <p:stCondLst>
+                              <p:cond delay="0"/>
+                            </p:stCondLst>
+                            <p:childTnLst>
+                              <p:par>
+                                <p:cTn id="5" presetID="10" presetClass="entr" presetSubtype="0" fill="hold" nodeType="clickEffect">
+                                  <p:stCondLst>
+                                    <p:cond delay="0"/>
+                                  </p:stCondLst>
+                                  <p:childTnLst>
+                                    <p:set>
+                                      <p:cBhvr>
+                                        <p:cTn id="6" dur="1" fill="hold">
+                                          <p:stCondLst>
+                                            <p:cond delay="0"/>
+                                          </p:stCondLst>
+                                        </p:cTn>
+                                        <p:tgtEl>
+                                          <p:spTgt spid="5"/>
+                                        </p:tgtEl>
+                                        <p:attrNameLst>
+                                          <p:attrName>style.visibility</p:attrName>
+                                        </p:attrNameLst>
+                                      </p:cBhvr>
+                                      <p:to>
+                                        <p:strVal val="visible"/>
+                                      </p:to>
+                                    </p:set>
+                                    <p:animEffect transition="in" filter="fade">
+                                      <p:cBhvr>
+                                        <p:cTn id="7" dur="500"/>
+                                        <p:tgtEl>
+                                          <p:spTgt spid="5"/>
+                                        </p:tgtEl>
+                                      </p:cBhvr>
+                                    </p:animEffect>
+                                  </p:childTnLst>
+                                </p:cTn>
+                              </p:par>
+                            </p:childTnLst>
+                          </p:cTn>
+                        </p:par>
+                      </p:childTnLst>
+                    </p:cTn>
+                  </p:par>
+                  <p:par>
+                    <p:cTn id="8" fill="hold">
+                      <p:stCondLst>
+                        <p:cond delay="indefinite"/>
+                      </p:stCondLst>
+                      <p:childTnLst>
+                        <p:par>
+                          <p:cTn id="9" fill="hold">
+                            <p:stCondLst>
+                              <p:cond delay="0"/>
+                            </p:stCondLst>
+                            <p:childTnLst>
+                              <p:par>
+                                <p:cTn id="10" presetID="10" presetClass="entr" presetSubtype="0" fill="hold" nodeType="clickEffect">
+                                  <p:stCondLst>
+                                    <p:cond delay="0"/>
+                                  </p:stCondLst>
+                                  <p:childTnLst>
+                                    <p:set>
+                                      <p:cBhvr>
+                                        <p:cTn id="11" dur="1" fill="hold">
+                                          <p:stCondLst>
+                                            <p:cond delay="0"/>
+                                          </p:stCondLst>
+                                        </p:cTn>
+                                        <p:tgtEl>
+                                          <p:spTgt spid="1026"/>
+                                        </p:tgtEl>
+                                        <p:attrNameLst>
+                                          <p:attrName>style.visibility</p:attrName>
+                                        </p:attrNameLst>
+                                      </p:cBhvr>
+                                      <p:to>
+                                        <p:strVal val="visible"/>
+                                      </p:to>
+                                    </p:set>
+                                    <p:animEffect transition="in" filter="fade">
+                                      <p:cBhvr>
+                                        <p:cTn id="12" dur="500"/>
+                                        <p:tgtEl>
+                                          <p:spTgt spid="1026"/>
+                                        </p:tgtEl>
+                                      </p:cBhvr>
+                                    </p:animEffect>
+                                  </p:childTnLst>
+                                </p:cTn>
+                              </p:par>
+                            </p:childTnLst>
+                          </p:cTn>
+                        </p:par>
+                      </p:childTnLst>
+                    </p:cTn>
+                  </p:par>
+                  <p:par>
+                    <p:cTn id="13" fill="hold">
+                      <p:stCondLst>
+                        <p:cond delay="indefinite"/>
+                      </p:stCondLst>
+                      <p:childTnLst>
+                        <p:par>
+                          <p:cTn id="14" fill="hold">
+                            <p:stCondLst>
+                              <p:cond delay="0"/>
+                            </p:stCondLst>
+                            <p:childTnLst>
+                              <p:par>
+                                <p:cTn id="15" presetID="10" presetClass="entr" presetSubtype="0" fill="hold" grpId="0" nodeType="clickEffect">
+                                  <p:stCondLst>
+                                    <p:cond delay="0"/>
+                                  </p:stCondLst>
+                                  <p:childTnLst>
+                                    <p:set>
+                                      <p:cBhvr>
+                                        <p:cTn id="16" dur="1" fill="hold">
+                                          <p:stCondLst>
+                                            <p:cond delay="0"/>
+                                          </p:stCondLst>
+                                        </p:cTn>
+                                        <p:tgtEl>
+                                          <p:spTgt spid="8"/>
+                                        </p:tgtEl>
+                                        <p:attrNameLst>
+                                          <p:attrName>style.visibility</p:attrName>
+                                        </p:attrNameLst>
+                                      </p:cBhvr>
+                                      <p:to>
+                                        <p:strVal val="visible"/>
+                                      </p:to>
+                                    </p:set>
+                                    <p:animEffect transition="in" filter="fade">
+                                      <p:cBhvr>
+                                        <p:cTn id="17" dur="500"/>
+                                        <p:tgtEl>
+                                          <p:spTgt spid="8"/>
+                                        </p:tgtEl>
+                                      </p:cBhvr>
+                                    </p:animEffect>
+                                  </p:childTnLst>
+                                </p:cTn>
+                              </p:par>
+                            </p:childTnLst>
+                          </p:cTn>
+                        </p:par>
+                      </p:childTnLst>
+                    </p:cTn>
+                  </p:par>
+                  <p:par>
+                    <p:cTn id="18" fill="hold">
+                      <p:stCondLst>
+                        <p:cond delay="indefinite"/>
+                      </p:stCondLst>
+                      <p:childTnLst>
+                        <p:par>
+                          <p:cTn id="19" fill="hold">
+                            <p:stCondLst>
+                              <p:cond delay="0"/>
+                            </p:stCondLst>
+                            <p:childTnLst>
+                              <p:par>
+                                <p:cTn id="20" presetID="10" presetClass="entr" presetSubtype="0" fill="hold" grpId="0" nodeType="clickEffect">
+                                  <p:stCondLst>
+                                    <p:cond delay="0"/>
+                                  </p:stCondLst>
+                                  <p:childTnLst>
+                                    <p:set>
+                                      <p:cBhvr>
+                                        <p:cTn id="21" dur="1" fill="hold">
+                                          <p:stCondLst>
+                                            <p:cond delay="0"/>
+                                          </p:stCondLst>
+                                        </p:cTn>
+                                        <p:tgtEl>
+                                          <p:spTgt spid="11"/>
+                                        </p:tgtEl>
+                                        <p:attrNameLst>
+                                          <p:attrName>style.visibility</p:attrName>
+                                        </p:attrNameLst>
+                                      </p:cBhvr>
+                                      <p:to>
+                                        <p:strVal val="visible"/>
+                                      </p:to>
+                                    </p:set>
+                                    <p:animEffect transition="in" filter="fade">
+                                      <p:cBhvr>
+                                        <p:cTn id="22" dur="500"/>
+                                        <p:tgtEl>
+                                          <p:spTgt spid="11"/>
+                                        </p:tgtEl>
+                                      </p:cBhvr>
+                                    </p:animEffect>
+                                  </p:childTnLst>
+                                </p:cTn>
+                              </p:par>
+                            </p:childTnLst>
+                          </p:cTn>
+                        </p:par>
+                      </p:childTnLst>
+                    </p:cTn>
+                  </p:par>
+                </p:childTnLst>
+              </p:cTn>
+              <p:prevCondLst>
+                <p:cond evt="onPrev" delay="0">
+                  <p:tgtEl>
+                    <p:sldTgt/>
+                  </p:tgtEl>
+                </p:cond>
+              </p:prevCondLst>
+              <p:nextCondLst>
+                <p:cond evt="onNext" delay="0">
+                  <p:tgtEl>
+                    <p:sldTgt/>
+                  </p:tgtEl>
+                </p:cond>
+              </p:nextCondLst>
+            </p:seq>
+          </p:childTnLst>
+        </p:cTn>
+      </p:par>
+    </p:tnLst>
+    <p:bldLst>
+      <p:bldP spid="8" grpId="0" animBg="1"/>
+      <p:bldP spid="11" grpId="0" animBg="1"/>
+    </p:bldLst>
+  </p:timing>
+</p:sld>
+</file>
+
+<file path=ppt/slides/slide5.xml><?xml version="1.0" encoding="utf-8"?>
+<p:sld xmlns:a="http://schemas.openxmlformats.org/drawingml/2006/main" xmlns:r="http://schemas.openxmlformats.org/officeDocument/2006/relationships" xmlns:p="http://schemas.openxmlformats.org/presentationml/2006/main">
+  <p:cSld>
+    <p:spTree>
+      <p:nvGrpSpPr>
+        <p:cNvPr id="1" name=""/>
+        <p:cNvGrpSpPr/>
+        <p:nvPr/>
+      </p:nvGrpSpPr>
+      <p:grpSpPr>
+        <a:xfrm>
+          <a:off x="0" y="0"/>
+          <a:ext cx="0" cy="0"/>
+          <a:chOff x="0" y="0"/>
+          <a:chExt cx="0" cy="0"/>
+        </a:xfrm>
+      </p:grpSpPr>
+      <p:sp>
+        <p:nvSpPr>
+          <p:cNvPr id="2" name="Title 1">
+            <a:extLst>
+              <a:ext uri="{FF2B5EF4-FFF2-40B4-BE49-F238E27FC236}">
+                <a16:creationId xmlns:a16="http://schemas.microsoft.com/office/drawing/2014/main" id="{32158A5C-455D-4369-AB83-4F9FDCBE0060}"/>
+              </a:ext>
+            </a:extLst>
+          </p:cNvPr>
+          <p:cNvSpPr>
+            <a:spLocks noGrp="1"/>
+          </p:cNvSpPr>
+          <p:nvPr>
+            <p:ph type="title"/>
+          </p:nvPr>
+        </p:nvSpPr>
+        <p:spPr/>
+        <p:txBody>
+          <a:bodyPr/>
+          <a:lstStyle/>
+          <a:p>
+            <a:r>
+              <a:rPr lang="en-US" dirty="0"/>
+              <a:t>History of JavaScript</a:t>
+            </a:r>
+            <a:endParaRPr lang="en-IN" dirty="0"/>
+          </a:p>
+        </p:txBody>
+      </p:sp>
+      <p:pic>
+        <p:nvPicPr>
+          <p:cNvPr id="2050" name="Picture 2">
+            <a:extLst>
+              <a:ext uri="{FF2B5EF4-FFF2-40B4-BE49-F238E27FC236}">
+                <a16:creationId xmlns:a16="http://schemas.microsoft.com/office/drawing/2014/main" id="{450249B8-333F-4611-BB52-F59394EC5D82}"/>
+              </a:ext>
+            </a:extLst>
+          </p:cNvPr>
+          <p:cNvPicPr>
+            <a:picLocks noChangeAspect="1" noChangeArrowheads="1"/>
+          </p:cNvPicPr>
+          <p:nvPr/>
+        </p:nvPicPr>
+        <p:blipFill>
+          <a:blip r:embed="rId2">
+            <a:extLst>
+              <a:ext uri="{28A0092B-C50C-407E-A947-70E740481C1C}">
+                <a14:useLocalDpi xmlns:a14="http://schemas.microsoft.com/office/drawing/2010/main" val="0"/>
+              </a:ext>
+            </a:extLst>
+          </a:blip>
+          <a:srcRect/>
+          <a:stretch>
+            <a:fillRect/>
+          </a:stretch>
+        </p:blipFill>
+        <p:spPr bwMode="auto">
+          <a:xfrm>
+            <a:off x="1096652" y="1832727"/>
+            <a:ext cx="1271785" cy="1271785"/>
+          </a:xfrm>
+          <a:prstGeom prst="rect">
+            <a:avLst/>
+          </a:prstGeom>
+          <a:noFill/>
+          <a:extLst>
+            <a:ext uri="{909E8E84-426E-40DD-AFC4-6F175D3DCCD1}">
+              <a14:hiddenFill xmlns:a14="http://schemas.microsoft.com/office/drawing/2010/main">
+                <a:solidFill>
+                  <a:srgbClr val="FFFFFF"/>
+                </a:solidFill>
+              </a14:hiddenFill>
+            </a:ext>
+          </a:extLst>
+        </p:spPr>
+      </p:pic>
+      <p:sp>
+        <p:nvSpPr>
+          <p:cNvPr id="4" name="TextBox 3">
+            <a:extLst>
+              <a:ext uri="{FF2B5EF4-FFF2-40B4-BE49-F238E27FC236}">
+                <a16:creationId xmlns:a16="http://schemas.microsoft.com/office/drawing/2014/main" id="{8415F564-7F68-4AFD-A573-6915040BEA61}"/>
+              </a:ext>
+            </a:extLst>
+          </p:cNvPr>
+          <p:cNvSpPr txBox="1"/>
+          <p:nvPr/>
+        </p:nvSpPr>
+        <p:spPr>
+          <a:xfrm>
+            <a:off x="2002074" y="2759696"/>
+            <a:ext cx="1051891" cy="400110"/>
+          </a:xfrm>
+          <a:prstGeom prst="rect">
+            <a:avLst/>
+          </a:prstGeom>
+          <a:noFill/>
+        </p:spPr>
+        <p:txBody>
+          <a:bodyPr wrap="none" rtlCol="0">
+            <a:spAutoFit/>
+          </a:bodyPr>
+          <a:lstStyle/>
+          <a:p>
+            <a:r>
+              <a:rPr lang="en-US" sz="2000" dirty="0">
+                <a:solidFill>
+                  <a:srgbClr val="7030A0"/>
+                </a:solidFill>
+                <a:latin typeface="Segoe UI Black" panose="020B0A02040204020203" pitchFamily="34" charset="0"/>
+                <a:ea typeface="Segoe UI Black" panose="020B0A02040204020203" pitchFamily="34" charset="0"/>
+                <a:cs typeface="Segoe UI Light" panose="020B0502040204020203" pitchFamily="34" charset="0"/>
+              </a:rPr>
+              <a:t>JScript</a:t>
+            </a:r>
+            <a:endParaRPr lang="en-IN" sz="2000" dirty="0">
+              <a:solidFill>
+                <a:srgbClr val="7030A0"/>
+              </a:solidFill>
+              <a:latin typeface="Segoe UI Black" panose="020B0A02040204020203" pitchFamily="34" charset="0"/>
+              <a:ea typeface="Segoe UI Black" panose="020B0A02040204020203" pitchFamily="34" charset="0"/>
+              <a:cs typeface="Segoe UI Light" panose="020B0502040204020203" pitchFamily="34" charset="0"/>
+            </a:endParaRPr>
+          </a:p>
+        </p:txBody>
+      </p:sp>
+      <p:pic>
+        <p:nvPicPr>
+          <p:cNvPr id="6" name="Picture 5">
+            <a:extLst>
+              <a:ext uri="{FF2B5EF4-FFF2-40B4-BE49-F238E27FC236}">
+                <a16:creationId xmlns:a16="http://schemas.microsoft.com/office/drawing/2014/main" id="{2DDA73CE-BDC0-4A22-8619-CBC2E617FA6E}"/>
+              </a:ext>
+            </a:extLst>
+          </p:cNvPr>
+          <p:cNvPicPr>
+            <a:picLocks noChangeAspect="1"/>
+          </p:cNvPicPr>
+          <p:nvPr/>
+        </p:nvPicPr>
+        <p:blipFill>
+          <a:blip r:embed="rId3"/>
+          <a:stretch>
+            <a:fillRect/>
+          </a:stretch>
+        </p:blipFill>
+        <p:spPr>
+          <a:xfrm>
+            <a:off x="6095999" y="1643193"/>
+            <a:ext cx="3108707" cy="989710"/>
+          </a:xfrm>
+          <a:prstGeom prst="rect">
+            <a:avLst/>
+          </a:prstGeom>
+        </p:spPr>
+      </p:pic>
+      <p:pic>
+        <p:nvPicPr>
+          <p:cNvPr id="2052" name="Picture 4" descr="Welcome to Ecma International">
+            <a:extLst>
+              <a:ext uri="{FF2B5EF4-FFF2-40B4-BE49-F238E27FC236}">
+                <a16:creationId xmlns:a16="http://schemas.microsoft.com/office/drawing/2014/main" id="{6A2CFC06-71B3-4D8F-A205-599FD493F325}"/>
+              </a:ext>
+            </a:extLst>
+          </p:cNvPr>
+          <p:cNvPicPr>
+            <a:picLocks noChangeAspect="1" noChangeArrowheads="1"/>
+          </p:cNvPicPr>
+          <p:nvPr/>
+        </p:nvPicPr>
+        <p:blipFill>
+          <a:blip r:embed="rId4">
+            <a:extLst>
+              <a:ext uri="{28A0092B-C50C-407E-A947-70E740481C1C}">
+                <a14:useLocalDpi xmlns:a14="http://schemas.microsoft.com/office/drawing/2010/main" val="0"/>
+              </a:ext>
+            </a:extLst>
+          </a:blip>
+          <a:srcRect/>
+          <a:stretch>
+            <a:fillRect/>
+          </a:stretch>
+        </p:blipFill>
+        <p:spPr bwMode="auto">
+          <a:xfrm>
+            <a:off x="8121033" y="3809850"/>
+            <a:ext cx="3232768" cy="1265373"/>
+          </a:xfrm>
+          <a:prstGeom prst="rect">
+            <a:avLst/>
+          </a:prstGeom>
+          <a:noFill/>
+          <a:extLst>
+            <a:ext uri="{909E8E84-426E-40DD-AFC4-6F175D3DCCD1}">
+              <a14:hiddenFill xmlns:a14="http://schemas.microsoft.com/office/drawing/2010/main">
+                <a:solidFill>
+                  <a:srgbClr val="FFFFFF"/>
+                </a:solidFill>
+              </a14:hiddenFill>
+            </a:ext>
+          </a:extLst>
+        </p:spPr>
+      </p:pic>
+      <p:pic>
+        <p:nvPicPr>
+          <p:cNvPr id="2054" name="Picture 6">
+            <a:extLst>
+              <a:ext uri="{FF2B5EF4-FFF2-40B4-BE49-F238E27FC236}">
+                <a16:creationId xmlns:a16="http://schemas.microsoft.com/office/drawing/2014/main" id="{7DD30906-53B4-42DA-835C-21E74F27CD6A}"/>
+              </a:ext>
+            </a:extLst>
+          </p:cNvPr>
+          <p:cNvPicPr>
+            <a:picLocks noChangeAspect="1" noChangeArrowheads="1"/>
+          </p:cNvPicPr>
+          <p:nvPr/>
+        </p:nvPicPr>
+        <p:blipFill>
+          <a:blip r:embed="rId5">
+            <a:extLst>
+              <a:ext uri="{28A0092B-C50C-407E-A947-70E740481C1C}">
+                <a14:useLocalDpi xmlns:a14="http://schemas.microsoft.com/office/drawing/2010/main" val="0"/>
+              </a:ext>
+            </a:extLst>
+          </a:blip>
+          <a:srcRect/>
+          <a:stretch>
+            <a:fillRect/>
+          </a:stretch>
+        </p:blipFill>
+        <p:spPr bwMode="auto">
+          <a:xfrm>
+            <a:off x="5313172" y="3040176"/>
+            <a:ext cx="967661" cy="912529"/>
+          </a:xfrm>
+          <a:prstGeom prst="rect">
+            <a:avLst/>
+          </a:prstGeom>
+          <a:noFill/>
+          <a:extLst>
+            <a:ext uri="{909E8E84-426E-40DD-AFC4-6F175D3DCCD1}">
+              <a14:hiddenFill xmlns:a14="http://schemas.microsoft.com/office/drawing/2010/main">
+                <a:solidFill>
+                  <a:srgbClr val="FFFFFF"/>
+                </a:solidFill>
+              </a14:hiddenFill>
+            </a:ext>
+          </a:extLst>
+        </p:spPr>
+      </p:pic>
+      <p:sp>
+        <p:nvSpPr>
+          <p:cNvPr id="9" name="TextBox 8">
+            <a:extLst>
+              <a:ext uri="{FF2B5EF4-FFF2-40B4-BE49-F238E27FC236}">
+                <a16:creationId xmlns:a16="http://schemas.microsoft.com/office/drawing/2014/main" id="{4B94632D-6194-439C-A272-84C49D5657BF}"/>
+              </a:ext>
+            </a:extLst>
+          </p:cNvPr>
+          <p:cNvSpPr txBox="1"/>
+          <p:nvPr/>
+        </p:nvSpPr>
+        <p:spPr>
+          <a:xfrm>
+            <a:off x="6042660" y="3752650"/>
+            <a:ext cx="805029" cy="400110"/>
+          </a:xfrm>
+          <a:prstGeom prst="rect">
+            <a:avLst/>
+          </a:prstGeom>
+          <a:noFill/>
+        </p:spPr>
+        <p:txBody>
+          <a:bodyPr wrap="none" rtlCol="0">
+            <a:spAutoFit/>
+          </a:bodyPr>
+          <a:lstStyle/>
+          <a:p>
+            <a:r>
+              <a:rPr lang="en-US" sz="2000" dirty="0">
+                <a:solidFill>
+                  <a:srgbClr val="7030A0"/>
+                </a:solidFill>
+                <a:latin typeface="Segoe UI Black" panose="020B0A02040204020203" pitchFamily="34" charset="0"/>
+                <a:ea typeface="Segoe UI Black" panose="020B0A02040204020203" pitchFamily="34" charset="0"/>
+                <a:cs typeface="Segoe UI Light" panose="020B0502040204020203" pitchFamily="34" charset="0"/>
+              </a:rPr>
+              <a:t>2004</a:t>
+            </a:r>
+            <a:endParaRPr lang="en-IN" sz="2000" dirty="0">
+              <a:solidFill>
+                <a:srgbClr val="7030A0"/>
+              </a:solidFill>
+              <a:latin typeface="Segoe UI Black" panose="020B0A02040204020203" pitchFamily="34" charset="0"/>
+              <a:ea typeface="Segoe UI Black" panose="020B0A02040204020203" pitchFamily="34" charset="0"/>
+              <a:cs typeface="Segoe UI Light" panose="020B0502040204020203" pitchFamily="34" charset="0"/>
+            </a:endParaRPr>
+          </a:p>
+        </p:txBody>
+      </p:sp>
+      <p:pic>
+        <p:nvPicPr>
+          <p:cNvPr id="2056" name="Picture 8">
+            <a:extLst>
+              <a:ext uri="{FF2B5EF4-FFF2-40B4-BE49-F238E27FC236}">
+                <a16:creationId xmlns:a16="http://schemas.microsoft.com/office/drawing/2014/main" id="{81FF7654-F22E-4E6C-BC77-CF545BAE3461}"/>
+              </a:ext>
+            </a:extLst>
+          </p:cNvPr>
+          <p:cNvPicPr>
+            <a:picLocks noChangeAspect="1" noChangeArrowheads="1"/>
+          </p:cNvPicPr>
+          <p:nvPr/>
+        </p:nvPicPr>
+        <p:blipFill>
+          <a:blip r:embed="rId6">
+            <a:extLst>
+              <a:ext uri="{28A0092B-C50C-407E-A947-70E740481C1C}">
+                <a14:useLocalDpi xmlns:a14="http://schemas.microsoft.com/office/drawing/2010/main" val="0"/>
+              </a:ext>
+            </a:extLst>
+          </a:blip>
+          <a:srcRect/>
+          <a:stretch>
+            <a:fillRect/>
+          </a:stretch>
+        </p:blipFill>
+        <p:spPr bwMode="auto">
+          <a:xfrm>
+            <a:off x="5248553" y="4449884"/>
+            <a:ext cx="809415" cy="809415"/>
+          </a:xfrm>
+          <a:prstGeom prst="rect">
+            <a:avLst/>
+          </a:prstGeom>
+          <a:noFill/>
+          <a:extLst>
+            <a:ext uri="{909E8E84-426E-40DD-AFC4-6F175D3DCCD1}">
+              <a14:hiddenFill xmlns:a14="http://schemas.microsoft.com/office/drawing/2010/main">
+                <a:solidFill>
+                  <a:srgbClr val="FFFFFF"/>
+                </a:solidFill>
+              </a14:hiddenFill>
+            </a:ext>
+          </a:extLst>
+        </p:spPr>
+      </p:pic>
+      <p:sp>
+        <p:nvSpPr>
+          <p:cNvPr id="11" name="TextBox 10">
+            <a:extLst>
+              <a:ext uri="{FF2B5EF4-FFF2-40B4-BE49-F238E27FC236}">
+                <a16:creationId xmlns:a16="http://schemas.microsoft.com/office/drawing/2014/main" id="{807782FE-E9A6-4A8F-B5B4-2615979B80A6}"/>
+              </a:ext>
+            </a:extLst>
+          </p:cNvPr>
+          <p:cNvSpPr txBox="1"/>
+          <p:nvPr/>
+        </p:nvSpPr>
+        <p:spPr>
+          <a:xfrm>
+            <a:off x="5797002" y="5144170"/>
+            <a:ext cx="800219" cy="400110"/>
+          </a:xfrm>
+          <a:prstGeom prst="rect">
+            <a:avLst/>
+          </a:prstGeom>
+          <a:noFill/>
+        </p:spPr>
+        <p:txBody>
+          <a:bodyPr wrap="none" rtlCol="0">
+            <a:spAutoFit/>
+          </a:bodyPr>
+          <a:lstStyle/>
+          <a:p>
+            <a:r>
+              <a:rPr lang="en-US" sz="2000" dirty="0">
+                <a:solidFill>
+                  <a:srgbClr val="7030A0"/>
+                </a:solidFill>
+                <a:latin typeface="Segoe UI Black" panose="020B0A02040204020203" pitchFamily="34" charset="0"/>
+                <a:ea typeface="Segoe UI Black" panose="020B0A02040204020203" pitchFamily="34" charset="0"/>
+                <a:cs typeface="Segoe UI Light" panose="020B0502040204020203" pitchFamily="34" charset="0"/>
+              </a:rPr>
+              <a:t>2008</a:t>
+            </a:r>
+            <a:endParaRPr lang="en-IN" sz="2000" dirty="0">
+              <a:solidFill>
+                <a:srgbClr val="7030A0"/>
+              </a:solidFill>
+              <a:latin typeface="Segoe UI Black" panose="020B0A02040204020203" pitchFamily="34" charset="0"/>
+              <a:ea typeface="Segoe UI Black" panose="020B0A02040204020203" pitchFamily="34" charset="0"/>
+              <a:cs typeface="Segoe UI Light" panose="020B0502040204020203" pitchFamily="34" charset="0"/>
+            </a:endParaRPr>
+          </a:p>
+        </p:txBody>
+      </p:sp>
+      <p:sp>
+        <p:nvSpPr>
+          <p:cNvPr id="12" name="TextBox 11">
+            <a:extLst>
+              <a:ext uri="{FF2B5EF4-FFF2-40B4-BE49-F238E27FC236}">
+                <a16:creationId xmlns:a16="http://schemas.microsoft.com/office/drawing/2014/main" id="{F32511B6-BF5D-40F0-B489-04616CF4671D}"/>
+              </a:ext>
+            </a:extLst>
+          </p:cNvPr>
+          <p:cNvSpPr txBox="1"/>
+          <p:nvPr/>
+        </p:nvSpPr>
+        <p:spPr>
+          <a:xfrm>
+            <a:off x="2288339" y="1677473"/>
+            <a:ext cx="769763" cy="400110"/>
+          </a:xfrm>
+          <a:prstGeom prst="rect">
+            <a:avLst/>
+          </a:prstGeom>
+          <a:noFill/>
+        </p:spPr>
+        <p:txBody>
+          <a:bodyPr wrap="none" rtlCol="0">
+            <a:spAutoFit/>
+          </a:bodyPr>
+          <a:lstStyle/>
+          <a:p>
+            <a:r>
+              <a:rPr lang="en-US" sz="2000" dirty="0">
+                <a:solidFill>
+                  <a:srgbClr val="7030A0"/>
+                </a:solidFill>
+                <a:latin typeface="Segoe UI Black" panose="020B0A02040204020203" pitchFamily="34" charset="0"/>
+                <a:ea typeface="Segoe UI Black" panose="020B0A02040204020203" pitchFamily="34" charset="0"/>
+                <a:cs typeface="Segoe UI Light" panose="020B0502040204020203" pitchFamily="34" charset="0"/>
+              </a:rPr>
+              <a:t>1995</a:t>
+            </a:r>
+            <a:endParaRPr lang="en-IN" sz="2000" dirty="0">
+              <a:solidFill>
+                <a:srgbClr val="7030A0"/>
+              </a:solidFill>
+              <a:latin typeface="Segoe UI Black" panose="020B0A02040204020203" pitchFamily="34" charset="0"/>
+              <a:ea typeface="Segoe UI Black" panose="020B0A02040204020203" pitchFamily="34" charset="0"/>
+              <a:cs typeface="Segoe UI Light" panose="020B0502040204020203" pitchFamily="34" charset="0"/>
+            </a:endParaRPr>
+          </a:p>
+        </p:txBody>
+      </p:sp>
+      <p:cxnSp>
+        <p:nvCxnSpPr>
+          <p:cNvPr id="7" name="Straight Arrow Connector 6">
+            <a:extLst>
+              <a:ext uri="{FF2B5EF4-FFF2-40B4-BE49-F238E27FC236}">
+                <a16:creationId xmlns:a16="http://schemas.microsoft.com/office/drawing/2014/main" id="{29189C3F-A2D8-4AA0-9330-E7843160A25A}"/>
+              </a:ext>
+            </a:extLst>
+          </p:cNvPr>
+          <p:cNvCxnSpPr/>
+          <p:nvPr/>
+        </p:nvCxnSpPr>
+        <p:spPr>
+          <a:xfrm>
+            <a:off x="8034371" y="2750269"/>
+            <a:ext cx="713703" cy="1059581"/>
+          </a:xfrm>
+          <a:prstGeom prst="straightConnector1">
+            <a:avLst/>
+          </a:prstGeom>
+          <a:ln>
+            <a:tailEnd type="triangle"/>
+          </a:ln>
+        </p:spPr>
+        <p:style>
+          <a:lnRef idx="3">
+            <a:schemeClr val="accent3"/>
+          </a:lnRef>
+          <a:fillRef idx="0">
+            <a:schemeClr val="accent3"/>
+          </a:fillRef>
+          <a:effectRef idx="2">
+            <a:schemeClr val="accent3"/>
+          </a:effectRef>
+          <a:fontRef idx="minor">
+            <a:schemeClr val="tx1"/>
+          </a:fontRef>
+        </p:style>
+      </p:cxnSp>
+      <p:cxnSp>
+        <p:nvCxnSpPr>
+          <p:cNvPr id="18" name="Straight Arrow Connector 17">
+            <a:extLst>
+              <a:ext uri="{FF2B5EF4-FFF2-40B4-BE49-F238E27FC236}">
+                <a16:creationId xmlns:a16="http://schemas.microsoft.com/office/drawing/2014/main" id="{3781643A-FB9A-475D-A6B5-A3F4D5A41943}"/>
+              </a:ext>
+            </a:extLst>
+          </p:cNvPr>
+          <p:cNvCxnSpPr>
+            <a:cxnSpLocks/>
+          </p:cNvCxnSpPr>
+          <p:nvPr/>
+        </p:nvCxnSpPr>
+        <p:spPr>
+          <a:xfrm>
+            <a:off x="6447934" y="3707132"/>
+            <a:ext cx="1586437" cy="473328"/>
+          </a:xfrm>
+          <a:prstGeom prst="straightConnector1">
+            <a:avLst/>
+          </a:prstGeom>
+          <a:ln>
+            <a:tailEnd type="triangle"/>
+          </a:ln>
+        </p:spPr>
+        <p:style>
+          <a:lnRef idx="3">
+            <a:schemeClr val="accent3"/>
+          </a:lnRef>
+          <a:fillRef idx="0">
+            <a:schemeClr val="accent3"/>
+          </a:fillRef>
+          <a:effectRef idx="2">
+            <a:schemeClr val="accent3"/>
+          </a:effectRef>
+          <a:fontRef idx="minor">
+            <a:schemeClr val="tx1"/>
+          </a:fontRef>
+        </p:style>
+      </p:cxnSp>
+      <p:cxnSp>
+        <p:nvCxnSpPr>
+          <p:cNvPr id="21" name="Straight Arrow Connector 20">
+            <a:extLst>
+              <a:ext uri="{FF2B5EF4-FFF2-40B4-BE49-F238E27FC236}">
+                <a16:creationId xmlns:a16="http://schemas.microsoft.com/office/drawing/2014/main" id="{F62C01AE-92F4-4956-A0E5-0CC54A502F52}"/>
+              </a:ext>
+            </a:extLst>
+          </p:cNvPr>
+          <p:cNvCxnSpPr>
+            <a:cxnSpLocks/>
+          </p:cNvCxnSpPr>
+          <p:nvPr/>
+        </p:nvCxnSpPr>
+        <p:spPr>
+          <a:xfrm flipV="1">
+            <a:off x="6280833" y="4636808"/>
+            <a:ext cx="1753538" cy="228426"/>
+          </a:xfrm>
+          <a:prstGeom prst="straightConnector1">
+            <a:avLst/>
+          </a:prstGeom>
+          <a:ln>
+            <a:tailEnd type="triangle"/>
+          </a:ln>
+        </p:spPr>
+        <p:style>
+          <a:lnRef idx="3">
+            <a:schemeClr val="accent3"/>
+          </a:lnRef>
+          <a:fillRef idx="0">
+            <a:schemeClr val="accent3"/>
+          </a:fillRef>
+          <a:effectRef idx="2">
+            <a:schemeClr val="accent3"/>
+          </a:effectRef>
+          <a:fontRef idx="minor">
+            <a:schemeClr val="tx1"/>
+          </a:fontRef>
+        </p:style>
+      </p:cxnSp>
+      <p:sp>
+        <p:nvSpPr>
+          <p:cNvPr id="24" name="TextBox 23">
+            <a:extLst>
+              <a:ext uri="{FF2B5EF4-FFF2-40B4-BE49-F238E27FC236}">
+                <a16:creationId xmlns:a16="http://schemas.microsoft.com/office/drawing/2014/main" id="{C3B732E7-FA3D-4CD4-A473-D677DFF7776C}"/>
+              </a:ext>
+            </a:extLst>
+          </p:cNvPr>
+          <p:cNvSpPr txBox="1"/>
+          <p:nvPr/>
+        </p:nvSpPr>
+        <p:spPr>
+          <a:xfrm>
+            <a:off x="803727" y="4449884"/>
+            <a:ext cx="3267241" cy="461665"/>
+          </a:xfrm>
+          <a:prstGeom prst="rect">
+            <a:avLst/>
+          </a:prstGeom>
+          <a:solidFill>
+            <a:schemeClr val="accent6">
+              <a:lumMod val="75000"/>
+            </a:schemeClr>
+          </a:solidFill>
+        </p:spPr>
+        <p:txBody>
+          <a:bodyPr wrap="none" rtlCol="0">
+            <a:spAutoFit/>
+          </a:bodyPr>
+          <a:lstStyle/>
+          <a:p>
+            <a:r>
+              <a:rPr lang="en-US" sz="2400" dirty="0">
+                <a:solidFill>
+                  <a:schemeClr val="bg1">
+                    <a:lumMod val="95000"/>
+                  </a:schemeClr>
+                </a:solidFill>
+                <a:latin typeface="Segoe UI Black" panose="020B0A02040204020203" pitchFamily="34" charset="0"/>
+                <a:ea typeface="Segoe UI Black" panose="020B0A02040204020203" pitchFamily="34" charset="0"/>
+                <a:cs typeface="Segoe UI Light" panose="020B0502040204020203" pitchFamily="34" charset="0"/>
+              </a:rPr>
+              <a:t>ECMAScript 5 - 2009</a:t>
+            </a:r>
+            <a:endParaRPr lang="en-IN" sz="2400" dirty="0">
+              <a:solidFill>
+                <a:schemeClr val="bg1">
+                  <a:lumMod val="95000"/>
+                </a:schemeClr>
+              </a:solidFill>
+              <a:latin typeface="Segoe UI Black" panose="020B0A02040204020203" pitchFamily="34" charset="0"/>
+              <a:ea typeface="Segoe UI Black" panose="020B0A02040204020203" pitchFamily="34" charset="0"/>
+              <a:cs typeface="Segoe UI Light" panose="020B0502040204020203" pitchFamily="34" charset="0"/>
+            </a:endParaRPr>
+          </a:p>
+        </p:txBody>
+      </p:sp>
+      <p:sp>
+        <p:nvSpPr>
+          <p:cNvPr id="25" name="TextBox 24">
+            <a:extLst>
+              <a:ext uri="{FF2B5EF4-FFF2-40B4-BE49-F238E27FC236}">
+                <a16:creationId xmlns:a16="http://schemas.microsoft.com/office/drawing/2014/main" id="{7629A1B5-2E4C-48CD-BED7-4A4B5FC52DA0}"/>
+              </a:ext>
+            </a:extLst>
+          </p:cNvPr>
+          <p:cNvSpPr txBox="1"/>
+          <p:nvPr/>
+        </p:nvSpPr>
+        <p:spPr>
+          <a:xfrm>
+            <a:off x="803727" y="5082615"/>
+            <a:ext cx="3231975" cy="461665"/>
+          </a:xfrm>
+          <a:prstGeom prst="rect">
+            <a:avLst/>
+          </a:prstGeom>
+          <a:solidFill>
+            <a:schemeClr val="accent6">
+              <a:lumMod val="75000"/>
+            </a:schemeClr>
+          </a:solidFill>
+        </p:spPr>
+        <p:txBody>
+          <a:bodyPr wrap="none" rtlCol="0">
+            <a:spAutoFit/>
+          </a:bodyPr>
+          <a:lstStyle/>
+          <a:p>
+            <a:r>
+              <a:rPr lang="en-US" sz="2400" dirty="0">
+                <a:solidFill>
+                  <a:schemeClr val="bg1">
+                    <a:lumMod val="95000"/>
+                  </a:schemeClr>
+                </a:solidFill>
+                <a:latin typeface="Segoe UI Black" panose="020B0A02040204020203" pitchFamily="34" charset="0"/>
+                <a:ea typeface="Segoe UI Black" panose="020B0A02040204020203" pitchFamily="34" charset="0"/>
+                <a:cs typeface="Segoe UI Light" panose="020B0502040204020203" pitchFamily="34" charset="0"/>
+              </a:rPr>
+              <a:t>ECMAScript 6 - 2015</a:t>
+            </a:r>
+            <a:endParaRPr lang="en-IN" sz="2400" dirty="0">
+              <a:solidFill>
+                <a:schemeClr val="bg1">
+                  <a:lumMod val="95000"/>
+                </a:schemeClr>
+              </a:solidFill>
+              <a:latin typeface="Segoe UI Black" panose="020B0A02040204020203" pitchFamily="34" charset="0"/>
+              <a:ea typeface="Segoe UI Black" panose="020B0A02040204020203" pitchFamily="34" charset="0"/>
+              <a:cs typeface="Segoe UI Light" panose="020B0502040204020203" pitchFamily="34" charset="0"/>
+            </a:endParaRPr>
+          </a:p>
+        </p:txBody>
+      </p:sp>
+      <p:sp>
+        <p:nvSpPr>
+          <p:cNvPr id="29" name="TextBox 28">
+            <a:extLst>
+              <a:ext uri="{FF2B5EF4-FFF2-40B4-BE49-F238E27FC236}">
+                <a16:creationId xmlns:a16="http://schemas.microsoft.com/office/drawing/2014/main" id="{4E4A61A4-5967-40AB-AA76-C49E9A64BE67}"/>
+              </a:ext>
+            </a:extLst>
+          </p:cNvPr>
+          <p:cNvSpPr txBox="1"/>
+          <p:nvPr/>
+        </p:nvSpPr>
+        <p:spPr>
+          <a:xfrm>
+            <a:off x="8609397" y="2377626"/>
+            <a:ext cx="769763" cy="400110"/>
+          </a:xfrm>
+          <a:prstGeom prst="rect">
+            <a:avLst/>
+          </a:prstGeom>
+          <a:noFill/>
+        </p:spPr>
+        <p:txBody>
+          <a:bodyPr wrap="none" rtlCol="0">
+            <a:spAutoFit/>
+          </a:bodyPr>
+          <a:lstStyle/>
+          <a:p>
+            <a:r>
+              <a:rPr lang="en-US" sz="2000" dirty="0">
+                <a:solidFill>
+                  <a:srgbClr val="7030A0"/>
+                </a:solidFill>
+                <a:latin typeface="Segoe UI Black" panose="020B0A02040204020203" pitchFamily="34" charset="0"/>
+                <a:ea typeface="Segoe UI Black" panose="020B0A02040204020203" pitchFamily="34" charset="0"/>
+                <a:cs typeface="Segoe UI Light" panose="020B0502040204020203" pitchFamily="34" charset="0"/>
+              </a:rPr>
+              <a:t>1996</a:t>
+            </a:r>
+            <a:endParaRPr lang="en-IN" sz="2000" dirty="0">
+              <a:solidFill>
+                <a:srgbClr val="7030A0"/>
+              </a:solidFill>
+              <a:latin typeface="Segoe UI Black" panose="020B0A02040204020203" pitchFamily="34" charset="0"/>
+              <a:ea typeface="Segoe UI Black" panose="020B0A02040204020203" pitchFamily="34" charset="0"/>
+              <a:cs typeface="Segoe UI Light" panose="020B0502040204020203" pitchFamily="34" charset="0"/>
+            </a:endParaRPr>
+          </a:p>
+        </p:txBody>
+      </p:sp>
+      <p:cxnSp>
+        <p:nvCxnSpPr>
+          <p:cNvPr id="30" name="Straight Arrow Connector 29">
+            <a:extLst>
+              <a:ext uri="{FF2B5EF4-FFF2-40B4-BE49-F238E27FC236}">
+                <a16:creationId xmlns:a16="http://schemas.microsoft.com/office/drawing/2014/main" id="{ED6934BA-B0F2-41DA-A6AA-DA81953BC5DE}"/>
+              </a:ext>
+            </a:extLst>
+          </p:cNvPr>
+          <p:cNvCxnSpPr>
+            <a:cxnSpLocks/>
+          </p:cNvCxnSpPr>
+          <p:nvPr/>
+        </p:nvCxnSpPr>
+        <p:spPr>
+          <a:xfrm flipH="1">
+            <a:off x="3750944" y="3476328"/>
+            <a:ext cx="1498497" cy="704132"/>
+          </a:xfrm>
+          <a:prstGeom prst="straightConnector1">
+            <a:avLst/>
+          </a:prstGeom>
+          <a:ln>
+            <a:tailEnd type="triangle"/>
+          </a:ln>
+        </p:spPr>
+        <p:style>
+          <a:lnRef idx="3">
+            <a:schemeClr val="accent3"/>
+          </a:lnRef>
+          <a:fillRef idx="0">
+            <a:schemeClr val="accent3"/>
+          </a:fillRef>
+          <a:effectRef idx="2">
+            <a:schemeClr val="accent3"/>
+          </a:effectRef>
+          <a:fontRef idx="minor">
+            <a:schemeClr val="tx1"/>
+          </a:fontRef>
+        </p:style>
+      </p:cxnSp>
+      <p:cxnSp>
+        <p:nvCxnSpPr>
+          <p:cNvPr id="33" name="Straight Arrow Connector 32">
+            <a:extLst>
+              <a:ext uri="{FF2B5EF4-FFF2-40B4-BE49-F238E27FC236}">
+                <a16:creationId xmlns:a16="http://schemas.microsoft.com/office/drawing/2014/main" id="{90CCF3E2-2EAF-4096-B516-103D6B0F7C38}"/>
+              </a:ext>
+            </a:extLst>
+          </p:cNvPr>
+          <p:cNvCxnSpPr>
+            <a:cxnSpLocks/>
+          </p:cNvCxnSpPr>
+          <p:nvPr/>
+        </p:nvCxnSpPr>
+        <p:spPr>
+          <a:xfrm flipH="1" flipV="1">
+            <a:off x="4293833" y="4729906"/>
+            <a:ext cx="681234" cy="124685"/>
+          </a:xfrm>
+          <a:prstGeom prst="straightConnector1">
+            <a:avLst/>
+          </a:prstGeom>
+          <a:ln>
+            <a:tailEnd type="triangle"/>
+          </a:ln>
+        </p:spPr>
+        <p:style>
+          <a:lnRef idx="3">
+            <a:schemeClr val="accent3"/>
+          </a:lnRef>
+          <a:fillRef idx="0">
+            <a:schemeClr val="accent3"/>
+          </a:fillRef>
+          <a:effectRef idx="2">
+            <a:schemeClr val="accent3"/>
+          </a:effectRef>
+          <a:fontRef idx="minor">
+            <a:schemeClr val="tx1"/>
+          </a:fontRef>
+        </p:style>
+      </p:cxnSp>
+      <p:pic>
+        <p:nvPicPr>
+          <p:cNvPr id="40" name="Picture 39">
+            <a:extLst>
+              <a:ext uri="{FF2B5EF4-FFF2-40B4-BE49-F238E27FC236}">
+                <a16:creationId xmlns:a16="http://schemas.microsoft.com/office/drawing/2014/main" id="{01CA115E-6DB9-432B-9D50-7B023660FF30}"/>
+              </a:ext>
+            </a:extLst>
+          </p:cNvPr>
+          <p:cNvPicPr>
+            <a:picLocks noChangeAspect="1"/>
+          </p:cNvPicPr>
+          <p:nvPr/>
+        </p:nvPicPr>
+        <p:blipFill>
+          <a:blip r:embed="rId7">
+            <a:lum bright="70000" contrast="-70000"/>
+            <a:extLst>
+              <a:ext uri="{BEBA8EAE-BF5A-486C-A8C5-ECC9F3942E4B}">
+                <a14:imgProps xmlns:a14="http://schemas.microsoft.com/office/drawing/2010/main">
+                  <a14:imgLayer r:embed="rId8">
+                    <a14:imgEffect>
+                      <a14:colorTemperature colorTemp="7200"/>
+                    </a14:imgEffect>
+                  </a14:imgLayer>
+                </a14:imgProps>
+              </a:ext>
+            </a:extLst>
+          </a:blip>
+          <a:stretch>
+            <a:fillRect/>
+          </a:stretch>
+        </p:blipFill>
+        <p:spPr>
+          <a:xfrm>
+            <a:off x="6016984" y="1618978"/>
+            <a:ext cx="3444904" cy="1096744"/>
+          </a:xfrm>
+          <a:prstGeom prst="rect">
+            <a:avLst/>
+          </a:prstGeom>
+        </p:spPr>
+      </p:pic>
+      <p:sp>
+        <p:nvSpPr>
+          <p:cNvPr id="41" name="TextBox 40">
+            <a:extLst>
+              <a:ext uri="{FF2B5EF4-FFF2-40B4-BE49-F238E27FC236}">
+                <a16:creationId xmlns:a16="http://schemas.microsoft.com/office/drawing/2014/main" id="{EB02395F-9CCC-4C1E-8795-3BCFA4ABFE18}"/>
+              </a:ext>
+            </a:extLst>
+          </p:cNvPr>
+          <p:cNvSpPr txBox="1"/>
+          <p:nvPr/>
+        </p:nvSpPr>
+        <p:spPr>
+          <a:xfrm>
+            <a:off x="8907052" y="2415775"/>
+            <a:ext cx="800219" cy="400110"/>
+          </a:xfrm>
+          <a:prstGeom prst="rect">
+            <a:avLst/>
+          </a:prstGeom>
+          <a:noFill/>
+        </p:spPr>
+        <p:txBody>
+          <a:bodyPr wrap="none" rtlCol="0">
+            <a:spAutoFit/>
+          </a:bodyPr>
+          <a:lstStyle/>
+          <a:p>
+            <a:r>
+              <a:rPr lang="en-US" sz="2000" dirty="0">
+                <a:solidFill>
+                  <a:srgbClr val="7030A0"/>
+                </a:solidFill>
+                <a:latin typeface="Segoe UI Black" panose="020B0A02040204020203" pitchFamily="34" charset="0"/>
+                <a:ea typeface="Segoe UI Black" panose="020B0A02040204020203" pitchFamily="34" charset="0"/>
+                <a:cs typeface="Segoe UI Light" panose="020B0502040204020203" pitchFamily="34" charset="0"/>
+              </a:rPr>
+              <a:t>2000</a:t>
+            </a:r>
+            <a:endParaRPr lang="en-IN" sz="2000" dirty="0">
+              <a:solidFill>
+                <a:srgbClr val="7030A0"/>
+              </a:solidFill>
+              <a:latin typeface="Segoe UI Black" panose="020B0A02040204020203" pitchFamily="34" charset="0"/>
+              <a:ea typeface="Segoe UI Black" panose="020B0A02040204020203" pitchFamily="34" charset="0"/>
+              <a:cs typeface="Segoe UI Light" panose="020B0502040204020203" pitchFamily="34" charset="0"/>
+            </a:endParaRPr>
+          </a:p>
+        </p:txBody>
+      </p:sp>
+    </p:spTree>
+    <p:extLst>
+      <p:ext uri="{BB962C8B-B14F-4D97-AF65-F5344CB8AC3E}">
+        <p14:creationId xmlns:p14="http://schemas.microsoft.com/office/powerpoint/2010/main" val="4136475441"/>
+      </p:ext>
+    </p:extLst>
+  </p:cSld>
+  <p:clrMapOvr>
+    <a:masterClrMapping/>
+  </p:clrMapOvr>
+  <p:timing>
+    <p:tnLst>
+      <p:par>
+        <p:cTn id="1" dur="indefinite" restart="never" nodeType="tmRoot">
+          <p:childTnLst>
+            <p:seq concurrent="1" nextAc="seek">
+              <p:cTn id="2" dur="indefinite" nodeType="mainSeq">
+                <p:childTnLst>
+                  <p:par>
+                    <p:cTn id="3" fill="hold">
+                      <p:stCondLst>
+                        <p:cond delay="indefinite"/>
+                      </p:stCondLst>
+                      <p:childTnLst>
+                        <p:par>
+                          <p:cTn id="4" fill="hold">
+                            <p:stCondLst>
+                              <p:cond delay="0"/>
+                            </p:stCondLst>
+                            <p:childTnLst>
+                              <p:par>
+                                <p:cTn id="5" presetID="10" presetClass="entr" presetSubtype="0" fill="hold" grpId="0" nodeType="clickEffect">
+                                  <p:stCondLst>
+                                    <p:cond delay="0"/>
+                                  </p:stCondLst>
+                                  <p:childTnLst>
+                                    <p:set>
+                                      <p:cBhvr>
+                                        <p:cTn id="6" dur="1" fill="hold">
+                                          <p:stCondLst>
+                                            <p:cond delay="0"/>
+                                          </p:stCondLst>
+                                        </p:cTn>
+                                        <p:tgtEl>
+                                          <p:spTgt spid="12"/>
+                                        </p:tgtEl>
+                                        <p:attrNameLst>
+                                          <p:attrName>style.visibility</p:attrName>
+                                        </p:attrNameLst>
+                                      </p:cBhvr>
+                                      <p:to>
+                                        <p:strVal val="visible"/>
+                                      </p:to>
+                                    </p:set>
+                                    <p:animEffect transition="in" filter="fade">
+                                      <p:cBhvr>
+                                        <p:cTn id="7" dur="500"/>
+                                        <p:tgtEl>
+                                          <p:spTgt spid="12"/>
+                                        </p:tgtEl>
+                                      </p:cBhvr>
+                                    </p:animEffect>
+                                  </p:childTnLst>
+                                </p:cTn>
+                              </p:par>
+                              <p:par>
+                                <p:cTn id="8" presetID="10" presetClass="entr" presetSubtype="0" fill="hold" nodeType="withEffect">
+                                  <p:stCondLst>
+                                    <p:cond delay="0"/>
+                                  </p:stCondLst>
+                                  <p:childTnLst>
+                                    <p:set>
+                                      <p:cBhvr>
+                                        <p:cTn id="9" dur="1" fill="hold">
+                                          <p:stCondLst>
+                                            <p:cond delay="0"/>
+                                          </p:stCondLst>
+                                        </p:cTn>
+                                        <p:tgtEl>
+                                          <p:spTgt spid="2050"/>
+                                        </p:tgtEl>
+                                        <p:attrNameLst>
+                                          <p:attrName>style.visibility</p:attrName>
+                                        </p:attrNameLst>
+                                      </p:cBhvr>
+                                      <p:to>
+                                        <p:strVal val="visible"/>
+                                      </p:to>
+                                    </p:set>
+                                    <p:animEffect transition="in" filter="fade">
+                                      <p:cBhvr>
+                                        <p:cTn id="10" dur="500"/>
+                                        <p:tgtEl>
+                                          <p:spTgt spid="2050"/>
+                                        </p:tgtEl>
+                                      </p:cBhvr>
+                                    </p:animEffect>
+                                  </p:childTnLst>
+                                </p:cTn>
+                              </p:par>
+                            </p:childTnLst>
+                          </p:cTn>
+                        </p:par>
+                      </p:childTnLst>
+                    </p:cTn>
+                  </p:par>
+                  <p:par>
+                    <p:cTn id="11" fill="hold">
+                      <p:stCondLst>
+                        <p:cond delay="indefinite"/>
+                      </p:stCondLst>
+                      <p:childTnLst>
+                        <p:par>
+                          <p:cTn id="12" fill="hold">
+                            <p:stCondLst>
+                              <p:cond delay="0"/>
+                            </p:stCondLst>
+                            <p:childTnLst>
+                              <p:par>
+                                <p:cTn id="13" presetID="10" presetClass="entr" presetSubtype="0" fill="hold" grpId="0" nodeType="clickEffect">
+                                  <p:stCondLst>
+                                    <p:cond delay="0"/>
+                                  </p:stCondLst>
+                                  <p:childTnLst>
+                                    <p:set>
+                                      <p:cBhvr>
+                                        <p:cTn id="14" dur="1" fill="hold">
+                                          <p:stCondLst>
+                                            <p:cond delay="0"/>
+                                          </p:stCondLst>
+                                        </p:cTn>
+                                        <p:tgtEl>
+                                          <p:spTgt spid="4"/>
+                                        </p:tgtEl>
+                                        <p:attrNameLst>
+                                          <p:attrName>style.visibility</p:attrName>
+                                        </p:attrNameLst>
+                                      </p:cBhvr>
+                                      <p:to>
+                                        <p:strVal val="visible"/>
+                                      </p:to>
+                                    </p:set>
+                                    <p:animEffect transition="in" filter="fade">
+                                      <p:cBhvr>
+                                        <p:cTn id="15" dur="500"/>
+                                        <p:tgtEl>
+                                          <p:spTgt spid="4"/>
+                                        </p:tgtEl>
+                                      </p:cBhvr>
+                                    </p:animEffect>
+                                  </p:childTnLst>
+                                </p:cTn>
+                              </p:par>
+                            </p:childTnLst>
+                          </p:cTn>
+                        </p:par>
+                      </p:childTnLst>
+                    </p:cTn>
+                  </p:par>
+                  <p:par>
+                    <p:cTn id="16" fill="hold">
+                      <p:stCondLst>
+                        <p:cond delay="indefinite"/>
+                      </p:stCondLst>
+                      <p:childTnLst>
+                        <p:par>
+                          <p:cTn id="17" fill="hold">
+                            <p:stCondLst>
+                              <p:cond delay="0"/>
+                            </p:stCondLst>
+                            <p:childTnLst>
+                              <p:par>
+                                <p:cTn id="18" presetID="10" presetClass="entr" presetSubtype="0" fill="hold" nodeType="clickEffect">
+                                  <p:stCondLst>
+                                    <p:cond delay="0"/>
+                                  </p:stCondLst>
+                                  <p:childTnLst>
+                                    <p:set>
+                                      <p:cBhvr>
+                                        <p:cTn id="19" dur="1" fill="hold">
+                                          <p:stCondLst>
+                                            <p:cond delay="0"/>
+                                          </p:stCondLst>
+                                        </p:cTn>
+                                        <p:tgtEl>
+                                          <p:spTgt spid="6"/>
+                                        </p:tgtEl>
+                                        <p:attrNameLst>
+                                          <p:attrName>style.visibility</p:attrName>
+                                        </p:attrNameLst>
+                                      </p:cBhvr>
+                                      <p:to>
+                                        <p:strVal val="visible"/>
+                                      </p:to>
+                                    </p:set>
+                                    <p:animEffect transition="in" filter="fade">
+                                      <p:cBhvr>
+                                        <p:cTn id="20" dur="500"/>
+                                        <p:tgtEl>
+                                          <p:spTgt spid="6"/>
+                                        </p:tgtEl>
+                                      </p:cBhvr>
+                                    </p:animEffect>
+                                  </p:childTnLst>
+                                </p:cTn>
+                              </p:par>
+                              <p:par>
+                                <p:cTn id="21" presetID="10" presetClass="entr" presetSubtype="0" fill="hold" grpId="0" nodeType="withEffect">
+                                  <p:stCondLst>
+                                    <p:cond delay="0"/>
+                                  </p:stCondLst>
+                                  <p:childTnLst>
+                                    <p:set>
+                                      <p:cBhvr>
+                                        <p:cTn id="22" dur="1" fill="hold">
+                                          <p:stCondLst>
+                                            <p:cond delay="0"/>
+                                          </p:stCondLst>
+                                        </p:cTn>
+                                        <p:tgtEl>
+                                          <p:spTgt spid="29"/>
+                                        </p:tgtEl>
+                                        <p:attrNameLst>
+                                          <p:attrName>style.visibility</p:attrName>
+                                        </p:attrNameLst>
+                                      </p:cBhvr>
+                                      <p:to>
+                                        <p:strVal val="visible"/>
+                                      </p:to>
+                                    </p:set>
+                                    <p:animEffect transition="in" filter="fade">
+                                      <p:cBhvr>
+                                        <p:cTn id="23" dur="500"/>
+                                        <p:tgtEl>
+                                          <p:spTgt spid="29"/>
+                                        </p:tgtEl>
+                                      </p:cBhvr>
+                                    </p:animEffect>
+                                  </p:childTnLst>
+                                </p:cTn>
+                              </p:par>
+                            </p:childTnLst>
+                          </p:cTn>
+                        </p:par>
+                        <p:par>
+                          <p:cTn id="24" fill="hold">
+                            <p:stCondLst>
+                              <p:cond delay="500"/>
+                            </p:stCondLst>
+                            <p:childTnLst>
+                              <p:par>
+                                <p:cTn id="25" presetID="10" presetClass="entr" presetSubtype="0" fill="hold" nodeType="afterEffect">
+                                  <p:stCondLst>
+                                    <p:cond delay="0"/>
+                                  </p:stCondLst>
+                                  <p:childTnLst>
+                                    <p:set>
+                                      <p:cBhvr>
+                                        <p:cTn id="26" dur="1" fill="hold">
+                                          <p:stCondLst>
+                                            <p:cond delay="0"/>
+                                          </p:stCondLst>
+                                        </p:cTn>
+                                        <p:tgtEl>
+                                          <p:spTgt spid="7"/>
+                                        </p:tgtEl>
+                                        <p:attrNameLst>
+                                          <p:attrName>style.visibility</p:attrName>
+                                        </p:attrNameLst>
+                                      </p:cBhvr>
+                                      <p:to>
+                                        <p:strVal val="visible"/>
+                                      </p:to>
+                                    </p:set>
+                                    <p:animEffect transition="in" filter="fade">
+                                      <p:cBhvr>
+                                        <p:cTn id="27" dur="500"/>
+                                        <p:tgtEl>
+                                          <p:spTgt spid="7"/>
+                                        </p:tgtEl>
+                                      </p:cBhvr>
+                                    </p:animEffect>
+                                  </p:childTnLst>
+                                </p:cTn>
+                              </p:par>
+                            </p:childTnLst>
+                          </p:cTn>
+                        </p:par>
+                        <p:par>
+                          <p:cTn id="28" fill="hold">
+                            <p:stCondLst>
+                              <p:cond delay="1000"/>
+                            </p:stCondLst>
+                            <p:childTnLst>
+                              <p:par>
+                                <p:cTn id="29" presetID="10" presetClass="entr" presetSubtype="0" fill="hold" nodeType="afterEffect">
+                                  <p:stCondLst>
+                                    <p:cond delay="0"/>
+                                  </p:stCondLst>
+                                  <p:childTnLst>
+                                    <p:set>
+                                      <p:cBhvr>
+                                        <p:cTn id="30" dur="1" fill="hold">
+                                          <p:stCondLst>
+                                            <p:cond delay="0"/>
+                                          </p:stCondLst>
+                                        </p:cTn>
+                                        <p:tgtEl>
+                                          <p:spTgt spid="2052"/>
+                                        </p:tgtEl>
+                                        <p:attrNameLst>
+                                          <p:attrName>style.visibility</p:attrName>
+                                        </p:attrNameLst>
+                                      </p:cBhvr>
+                                      <p:to>
+                                        <p:strVal val="visible"/>
+                                      </p:to>
+                                    </p:set>
+                                    <p:animEffect transition="in" filter="fade">
+                                      <p:cBhvr>
+                                        <p:cTn id="31" dur="500"/>
+                                        <p:tgtEl>
+                                          <p:spTgt spid="2052"/>
+                                        </p:tgtEl>
+                                      </p:cBhvr>
+                                    </p:animEffect>
+                                  </p:childTnLst>
+                                </p:cTn>
+                              </p:par>
+                            </p:childTnLst>
+                          </p:cTn>
+                        </p:par>
+                      </p:childTnLst>
+                    </p:cTn>
+                  </p:par>
+                  <p:par>
+                    <p:cTn id="32" fill="hold">
+                      <p:stCondLst>
+                        <p:cond delay="indefinite"/>
+                      </p:stCondLst>
+                      <p:childTnLst>
+                        <p:par>
+                          <p:cTn id="33" fill="hold">
+                            <p:stCondLst>
+                              <p:cond delay="0"/>
+                            </p:stCondLst>
+                            <p:childTnLst>
+                              <p:par>
+                                <p:cTn id="34" presetID="10" presetClass="entr" presetSubtype="0" fill="hold" nodeType="clickEffect">
+                                  <p:stCondLst>
+                                    <p:cond delay="0"/>
+                                  </p:stCondLst>
+                                  <p:childTnLst>
+                                    <p:set>
+                                      <p:cBhvr>
+                                        <p:cTn id="35" dur="1" fill="hold">
+                                          <p:stCondLst>
+                                            <p:cond delay="0"/>
+                                          </p:stCondLst>
+                                        </p:cTn>
+                                        <p:tgtEl>
+                                          <p:spTgt spid="40"/>
+                                        </p:tgtEl>
+                                        <p:attrNameLst>
+                                          <p:attrName>style.visibility</p:attrName>
+                                        </p:attrNameLst>
+                                      </p:cBhvr>
+                                      <p:to>
+                                        <p:strVal val="visible"/>
+                                      </p:to>
+                                    </p:set>
+                                    <p:animEffect transition="in" filter="fade">
+                                      <p:cBhvr>
+                                        <p:cTn id="36" dur="500"/>
+                                        <p:tgtEl>
+                                          <p:spTgt spid="40"/>
+                                        </p:tgtEl>
+                                      </p:cBhvr>
+                                    </p:animEffect>
+                                  </p:childTnLst>
+                                </p:cTn>
+                              </p:par>
+                              <p:par>
+                                <p:cTn id="37" presetID="10" presetClass="entr" presetSubtype="0" fill="hold" grpId="0" nodeType="withEffect">
+                                  <p:stCondLst>
+                                    <p:cond delay="0"/>
+                                  </p:stCondLst>
+                                  <p:childTnLst>
+                                    <p:set>
+                                      <p:cBhvr>
+                                        <p:cTn id="38" dur="1" fill="hold">
+                                          <p:stCondLst>
+                                            <p:cond delay="0"/>
+                                          </p:stCondLst>
+                                        </p:cTn>
+                                        <p:tgtEl>
+                                          <p:spTgt spid="41"/>
+                                        </p:tgtEl>
+                                        <p:attrNameLst>
+                                          <p:attrName>style.visibility</p:attrName>
+                                        </p:attrNameLst>
+                                      </p:cBhvr>
+                                      <p:to>
+                                        <p:strVal val="visible"/>
+                                      </p:to>
+                                    </p:set>
+                                    <p:animEffect transition="in" filter="fade">
+                                      <p:cBhvr>
+                                        <p:cTn id="39" dur="500"/>
+                                        <p:tgtEl>
+                                          <p:spTgt spid="41"/>
+                                        </p:tgtEl>
+                                      </p:cBhvr>
+                                    </p:animEffect>
+                                  </p:childTnLst>
+                                </p:cTn>
+                              </p:par>
+                            </p:childTnLst>
+                          </p:cTn>
+                        </p:par>
+                      </p:childTnLst>
+                    </p:cTn>
+                  </p:par>
+                  <p:par>
+                    <p:cTn id="40" fill="hold">
+                      <p:stCondLst>
+                        <p:cond delay="indefinite"/>
+                      </p:stCondLst>
+                      <p:childTnLst>
+                        <p:par>
+                          <p:cTn id="41" fill="hold">
+                            <p:stCondLst>
+                              <p:cond delay="0"/>
+                            </p:stCondLst>
+                            <p:childTnLst>
+                              <p:par>
+                                <p:cTn id="42" presetID="10" presetClass="entr" presetSubtype="0" fill="hold" nodeType="clickEffect">
+                                  <p:stCondLst>
+                                    <p:cond delay="0"/>
+                                  </p:stCondLst>
+                                  <p:childTnLst>
+                                    <p:set>
+                                      <p:cBhvr>
+                                        <p:cTn id="43" dur="1" fill="hold">
+                                          <p:stCondLst>
+                                            <p:cond delay="0"/>
+                                          </p:stCondLst>
+                                        </p:cTn>
+                                        <p:tgtEl>
+                                          <p:spTgt spid="2054"/>
+                                        </p:tgtEl>
+                                        <p:attrNameLst>
+                                          <p:attrName>style.visibility</p:attrName>
+                                        </p:attrNameLst>
+                                      </p:cBhvr>
+                                      <p:to>
+                                        <p:strVal val="visible"/>
+                                      </p:to>
+                                    </p:set>
+                                    <p:animEffect transition="in" filter="fade">
+                                      <p:cBhvr>
+                                        <p:cTn id="44" dur="500"/>
+                                        <p:tgtEl>
+                                          <p:spTgt spid="2054"/>
+                                        </p:tgtEl>
+                                      </p:cBhvr>
+                                    </p:animEffect>
+                                  </p:childTnLst>
+                                </p:cTn>
+                              </p:par>
+                              <p:par>
+                                <p:cTn id="45" presetID="10" presetClass="entr" presetSubtype="0" fill="hold" grpId="0" nodeType="withEffect">
+                                  <p:stCondLst>
+                                    <p:cond delay="0"/>
+                                  </p:stCondLst>
+                                  <p:childTnLst>
+                                    <p:set>
+                                      <p:cBhvr>
+                                        <p:cTn id="46" dur="1" fill="hold">
+                                          <p:stCondLst>
+                                            <p:cond delay="0"/>
+                                          </p:stCondLst>
+                                        </p:cTn>
+                                        <p:tgtEl>
+                                          <p:spTgt spid="9"/>
+                                        </p:tgtEl>
+                                        <p:attrNameLst>
+                                          <p:attrName>style.visibility</p:attrName>
+                                        </p:attrNameLst>
+                                      </p:cBhvr>
+                                      <p:to>
+                                        <p:strVal val="visible"/>
+                                      </p:to>
+                                    </p:set>
+                                    <p:animEffect transition="in" filter="fade">
+                                      <p:cBhvr>
+                                        <p:cTn id="47" dur="500"/>
+                                        <p:tgtEl>
+                                          <p:spTgt spid="9"/>
+                                        </p:tgtEl>
+                                      </p:cBhvr>
+                                    </p:animEffect>
+                                  </p:childTnLst>
+                                </p:cTn>
+                              </p:par>
+                            </p:childTnLst>
+                          </p:cTn>
+                        </p:par>
+                        <p:par>
+                          <p:cTn id="48" fill="hold">
+                            <p:stCondLst>
+                              <p:cond delay="500"/>
+                            </p:stCondLst>
+                            <p:childTnLst>
+                              <p:par>
+                                <p:cTn id="49" presetID="10" presetClass="entr" presetSubtype="0" fill="hold" nodeType="afterEffect">
+                                  <p:stCondLst>
+                                    <p:cond delay="0"/>
+                                  </p:stCondLst>
+                                  <p:childTnLst>
+                                    <p:set>
+                                      <p:cBhvr>
+                                        <p:cTn id="50" dur="1" fill="hold">
+                                          <p:stCondLst>
+                                            <p:cond delay="0"/>
+                                          </p:stCondLst>
+                                        </p:cTn>
+                                        <p:tgtEl>
+                                          <p:spTgt spid="18"/>
+                                        </p:tgtEl>
+                                        <p:attrNameLst>
+                                          <p:attrName>style.visibility</p:attrName>
+                                        </p:attrNameLst>
+                                      </p:cBhvr>
+                                      <p:to>
+                                        <p:strVal val="visible"/>
+                                      </p:to>
+                                    </p:set>
+                                    <p:animEffect transition="in" filter="fade">
+                                      <p:cBhvr>
+                                        <p:cTn id="51" dur="500"/>
+                                        <p:tgtEl>
+                                          <p:spTgt spid="18"/>
+                                        </p:tgtEl>
+                                      </p:cBhvr>
+                                    </p:animEffect>
+                                  </p:childTnLst>
+                                </p:cTn>
+                              </p:par>
+                            </p:childTnLst>
+                          </p:cTn>
+                        </p:par>
+                      </p:childTnLst>
+                    </p:cTn>
+                  </p:par>
+                  <p:par>
+                    <p:cTn id="52" fill="hold">
+                      <p:stCondLst>
+                        <p:cond delay="indefinite"/>
+                      </p:stCondLst>
+                      <p:childTnLst>
+                        <p:par>
+                          <p:cTn id="53" fill="hold">
+                            <p:stCondLst>
+                              <p:cond delay="0"/>
+                            </p:stCondLst>
+                            <p:childTnLst>
+                              <p:par>
+                                <p:cTn id="54" presetID="10" presetClass="entr" presetSubtype="0" fill="hold" nodeType="clickEffect">
+                                  <p:stCondLst>
+                                    <p:cond delay="0"/>
+                                  </p:stCondLst>
+                                  <p:childTnLst>
+                                    <p:set>
+                                      <p:cBhvr>
+                                        <p:cTn id="55" dur="1" fill="hold">
+                                          <p:stCondLst>
+                                            <p:cond delay="0"/>
+                                          </p:stCondLst>
+                                        </p:cTn>
+                                        <p:tgtEl>
+                                          <p:spTgt spid="2056"/>
+                                        </p:tgtEl>
+                                        <p:attrNameLst>
+                                          <p:attrName>style.visibility</p:attrName>
+                                        </p:attrNameLst>
+                                      </p:cBhvr>
+                                      <p:to>
+                                        <p:strVal val="visible"/>
+                                      </p:to>
+                                    </p:set>
+                                    <p:animEffect transition="in" filter="fade">
+                                      <p:cBhvr>
+                                        <p:cTn id="56" dur="500"/>
+                                        <p:tgtEl>
+                                          <p:spTgt spid="2056"/>
+                                        </p:tgtEl>
+                                      </p:cBhvr>
+                                    </p:animEffect>
+                                  </p:childTnLst>
+                                </p:cTn>
+                              </p:par>
+                              <p:par>
+                                <p:cTn id="57" presetID="10" presetClass="entr" presetSubtype="0" fill="hold" grpId="0" nodeType="withEffect">
+                                  <p:stCondLst>
+                                    <p:cond delay="0"/>
+                                  </p:stCondLst>
+                                  <p:childTnLst>
+                                    <p:set>
+                                      <p:cBhvr>
+                                        <p:cTn id="58" dur="1" fill="hold">
+                                          <p:stCondLst>
+                                            <p:cond delay="0"/>
+                                          </p:stCondLst>
+                                        </p:cTn>
+                                        <p:tgtEl>
+                                          <p:spTgt spid="11"/>
+                                        </p:tgtEl>
+                                        <p:attrNameLst>
+                                          <p:attrName>style.visibility</p:attrName>
+                                        </p:attrNameLst>
+                                      </p:cBhvr>
+                                      <p:to>
+                                        <p:strVal val="visible"/>
+                                      </p:to>
+                                    </p:set>
+                                    <p:animEffect transition="in" filter="fade">
+                                      <p:cBhvr>
+                                        <p:cTn id="59" dur="500"/>
+                                        <p:tgtEl>
+                                          <p:spTgt spid="11"/>
+                                        </p:tgtEl>
+                                      </p:cBhvr>
+                                    </p:animEffect>
+                                  </p:childTnLst>
+                                </p:cTn>
+                              </p:par>
+                            </p:childTnLst>
+                          </p:cTn>
+                        </p:par>
+                        <p:par>
+                          <p:cTn id="60" fill="hold">
+                            <p:stCondLst>
+                              <p:cond delay="500"/>
+                            </p:stCondLst>
+                            <p:childTnLst>
+                              <p:par>
+                                <p:cTn id="61" presetID="10" presetClass="entr" presetSubtype="0" fill="hold" nodeType="afterEffect">
+                                  <p:stCondLst>
+                                    <p:cond delay="0"/>
+                                  </p:stCondLst>
+                                  <p:childTnLst>
+                                    <p:set>
+                                      <p:cBhvr>
+                                        <p:cTn id="62" dur="1" fill="hold">
+                                          <p:stCondLst>
+                                            <p:cond delay="0"/>
+                                          </p:stCondLst>
+                                        </p:cTn>
+                                        <p:tgtEl>
+                                          <p:spTgt spid="21"/>
+                                        </p:tgtEl>
+                                        <p:attrNameLst>
+                                          <p:attrName>style.visibility</p:attrName>
+                                        </p:attrNameLst>
+                                      </p:cBhvr>
+                                      <p:to>
+                                        <p:strVal val="visible"/>
+                                      </p:to>
+                                    </p:set>
+                                    <p:animEffect transition="in" filter="fade">
+                                      <p:cBhvr>
+                                        <p:cTn id="63" dur="500"/>
+                                        <p:tgtEl>
+                                          <p:spTgt spid="21"/>
+                                        </p:tgtEl>
+                                      </p:cBhvr>
+                                    </p:animEffect>
+                                  </p:childTnLst>
+                                </p:cTn>
+                              </p:par>
+                            </p:childTnLst>
+                          </p:cTn>
+                        </p:par>
+                      </p:childTnLst>
+                    </p:cTn>
+                  </p:par>
+                  <p:par>
+                    <p:cTn id="64" fill="hold">
+                      <p:stCondLst>
+                        <p:cond delay="indefinite"/>
+                      </p:stCondLst>
+                      <p:childTnLst>
+                        <p:par>
+                          <p:cTn id="65" fill="hold">
+                            <p:stCondLst>
+                              <p:cond delay="0"/>
+                            </p:stCondLst>
+                            <p:childTnLst>
+                              <p:par>
+                                <p:cTn id="66" presetID="10" presetClass="entr" presetSubtype="0" fill="hold" grpId="0" nodeType="clickEffect">
+                                  <p:stCondLst>
+                                    <p:cond delay="0"/>
+                                  </p:stCondLst>
+                                  <p:childTnLst>
+                                    <p:set>
+                                      <p:cBhvr>
+                                        <p:cTn id="67" dur="1" fill="hold">
+                                          <p:stCondLst>
+                                            <p:cond delay="0"/>
+                                          </p:stCondLst>
+                                        </p:cTn>
+                                        <p:tgtEl>
+                                          <p:spTgt spid="24"/>
+                                        </p:tgtEl>
+                                        <p:attrNameLst>
+                                          <p:attrName>style.visibility</p:attrName>
+                                        </p:attrNameLst>
+                                      </p:cBhvr>
+                                      <p:to>
+                                        <p:strVal val="visible"/>
+                                      </p:to>
+                                    </p:set>
+                                    <p:animEffect transition="in" filter="fade">
+                                      <p:cBhvr>
+                                        <p:cTn id="68" dur="500"/>
+                                        <p:tgtEl>
+                                          <p:spTgt spid="24"/>
+                                        </p:tgtEl>
+                                      </p:cBhvr>
+                                    </p:animEffect>
+                                  </p:childTnLst>
+                                </p:cTn>
+                              </p:par>
+                              <p:par>
+                                <p:cTn id="69" presetID="10" presetClass="entr" presetSubtype="0" fill="hold" nodeType="withEffect">
+                                  <p:stCondLst>
+                                    <p:cond delay="0"/>
+                                  </p:stCondLst>
+                                  <p:childTnLst>
+                                    <p:set>
+                                      <p:cBhvr>
+                                        <p:cTn id="70" dur="1" fill="hold">
+                                          <p:stCondLst>
+                                            <p:cond delay="0"/>
+                                          </p:stCondLst>
+                                        </p:cTn>
+                                        <p:tgtEl>
+                                          <p:spTgt spid="30"/>
+                                        </p:tgtEl>
+                                        <p:attrNameLst>
+                                          <p:attrName>style.visibility</p:attrName>
+                                        </p:attrNameLst>
+                                      </p:cBhvr>
+                                      <p:to>
+                                        <p:strVal val="visible"/>
+                                      </p:to>
+                                    </p:set>
+                                    <p:animEffect transition="in" filter="fade">
+                                      <p:cBhvr>
+                                        <p:cTn id="71" dur="500"/>
+                                        <p:tgtEl>
+                                          <p:spTgt spid="30"/>
+                                        </p:tgtEl>
+                                      </p:cBhvr>
+                                    </p:animEffect>
+                                  </p:childTnLst>
+                                </p:cTn>
+                              </p:par>
+                              <p:par>
+                                <p:cTn id="72" presetID="10" presetClass="entr" presetSubtype="0" fill="hold" nodeType="withEffect">
+                                  <p:stCondLst>
+                                    <p:cond delay="0"/>
+                                  </p:stCondLst>
+                                  <p:childTnLst>
+                                    <p:set>
+                                      <p:cBhvr>
+                                        <p:cTn id="73" dur="1" fill="hold">
+                                          <p:stCondLst>
+                                            <p:cond delay="0"/>
+                                          </p:stCondLst>
+                                        </p:cTn>
+                                        <p:tgtEl>
+                                          <p:spTgt spid="33"/>
+                                        </p:tgtEl>
+                                        <p:attrNameLst>
+                                          <p:attrName>style.visibility</p:attrName>
+                                        </p:attrNameLst>
+                                      </p:cBhvr>
+                                      <p:to>
+                                        <p:strVal val="visible"/>
+                                      </p:to>
+                                    </p:set>
+                                    <p:animEffect transition="in" filter="fade">
+                                      <p:cBhvr>
+                                        <p:cTn id="74" dur="500"/>
+                                        <p:tgtEl>
+                                          <p:spTgt spid="33"/>
+                                        </p:tgtEl>
+                                      </p:cBhvr>
+                                    </p:animEffect>
+                                  </p:childTnLst>
+                                </p:cTn>
+                              </p:par>
+                            </p:childTnLst>
+                          </p:cTn>
+                        </p:par>
+                      </p:childTnLst>
+                    </p:cTn>
+                  </p:par>
+                  <p:par>
+                    <p:cTn id="75" fill="hold">
+                      <p:stCondLst>
+                        <p:cond delay="indefinite"/>
+                      </p:stCondLst>
+                      <p:childTnLst>
+                        <p:par>
+                          <p:cTn id="76" fill="hold">
+                            <p:stCondLst>
+                              <p:cond delay="0"/>
+                            </p:stCondLst>
+                            <p:childTnLst>
+                              <p:par>
+                                <p:cTn id="77" presetID="10" presetClass="entr" presetSubtype="0" fill="hold" grpId="0" nodeType="clickEffect">
+                                  <p:stCondLst>
+                                    <p:cond delay="0"/>
+                                  </p:stCondLst>
+                                  <p:childTnLst>
+                                    <p:set>
+                                      <p:cBhvr>
+                                        <p:cTn id="78" dur="1" fill="hold">
+                                          <p:stCondLst>
+                                            <p:cond delay="0"/>
+                                          </p:stCondLst>
+                                        </p:cTn>
+                                        <p:tgtEl>
+                                          <p:spTgt spid="25"/>
+                                        </p:tgtEl>
+                                        <p:attrNameLst>
+                                          <p:attrName>style.visibility</p:attrName>
+                                        </p:attrNameLst>
+                                      </p:cBhvr>
+                                      <p:to>
+                                        <p:strVal val="visible"/>
+                                      </p:to>
+                                    </p:set>
+                                    <p:animEffect transition="in" filter="fade">
+                                      <p:cBhvr>
+                                        <p:cTn id="79" dur="500"/>
+                                        <p:tgtEl>
+                                          <p:spTgt spid="25"/>
+                                        </p:tgtEl>
+                                      </p:cBhvr>
+                                    </p:animEffect>
+                                  </p:childTnLst>
+                                </p:cTn>
+                              </p:par>
+                            </p:childTnLst>
+                          </p:cTn>
+                        </p:par>
+                      </p:childTnLst>
+                    </p:cTn>
+                  </p:par>
+                </p:childTnLst>
+              </p:cTn>
+              <p:prevCondLst>
+                <p:cond evt="onPrev" delay="0">
+                  <p:tgtEl>
+                    <p:sldTgt/>
+                  </p:tgtEl>
+                </p:cond>
+              </p:prevCondLst>
+              <p:nextCondLst>
+                <p:cond evt="onNext" delay="0">
+                  <p:tgtEl>
+                    <p:sldTgt/>
+                  </p:tgtEl>
+                </p:cond>
+              </p:nextCondLst>
+            </p:seq>
+          </p:childTnLst>
+        </p:cTn>
+      </p:par>
+    </p:tnLst>
+    <p:bldLst>
+      <p:bldP spid="4" grpId="0"/>
+      <p:bldP spid="9" grpId="0"/>
+      <p:bldP spid="11" grpId="0"/>
+      <p:bldP spid="12" grpId="0"/>
+      <p:bldP spid="24" grpId="0" animBg="1"/>
+      <p:bldP spid="25" grpId="0" animBg="1"/>
+      <p:bldP spid="29" grpId="0"/>
+      <p:bldP spid="41" grpId="0"/>
+    </p:bldLst>
+  </p:timing>
+</p:sld>
+</file>
+
 <file path=ppt/theme/theme1.xml><?xml version="1.0" encoding="utf-8"?>
 <a:theme xmlns:a="http://schemas.openxmlformats.org/drawingml/2006/main" name="Office Theme">
   <a:themeElements>

</xml_diff>